<commit_message>
Before and after done
</commit_message>
<xml_diff>
--- a/HolisticTesting/8SimpleTestingRules.pptx
+++ b/HolisticTesting/8SimpleTestingRules.pptx
@@ -236,7 +236,7 @@
           <a:p>
             <a:fld id="{A38EFB5D-C955-4A15-9C79-0B0ABD276E0E}" type="datetimeFigureOut">
               <a:rPr lang="en-US" smtClean="0"/>
-              <a:t>1/14/2015</a:t>
+              <a:t>3/2/2015</a:t>
             </a:fld>
             <a:endParaRPr lang="en-US"/>
           </a:p>
@@ -921,7 +921,7 @@
           <a:p>
             <a:fld id="{77BDE6C7-8377-45F7-9778-8568E72EC050}" type="datetimeFigureOut">
               <a:rPr lang="en-US" smtClean="0"/>
-              <a:t>1/14/2015</a:t>
+              <a:t>3/2/2015</a:t>
             </a:fld>
             <a:endParaRPr lang="en-US"/>
           </a:p>
@@ -1091,7 +1091,7 @@
           <a:p>
             <a:fld id="{77BDE6C7-8377-45F7-9778-8568E72EC050}" type="datetimeFigureOut">
               <a:rPr lang="en-US" smtClean="0"/>
-              <a:t>1/14/2015</a:t>
+              <a:t>3/2/2015</a:t>
             </a:fld>
             <a:endParaRPr lang="en-US"/>
           </a:p>
@@ -1271,7 +1271,7 @@
           <a:p>
             <a:fld id="{77BDE6C7-8377-45F7-9778-8568E72EC050}" type="datetimeFigureOut">
               <a:rPr lang="en-US" smtClean="0"/>
-              <a:t>1/14/2015</a:t>
+              <a:t>3/2/2015</a:t>
             </a:fld>
             <a:endParaRPr lang="en-US"/>
           </a:p>
@@ -1441,7 +1441,7 @@
           <a:p>
             <a:fld id="{77BDE6C7-8377-45F7-9778-8568E72EC050}" type="datetimeFigureOut">
               <a:rPr lang="en-US" smtClean="0"/>
-              <a:t>1/14/2015</a:t>
+              <a:t>3/2/2015</a:t>
             </a:fld>
             <a:endParaRPr lang="en-US"/>
           </a:p>
@@ -1694,7 +1694,7 @@
           <a:p>
             <a:fld id="{77BDE6C7-8377-45F7-9778-8568E72EC050}" type="datetimeFigureOut">
               <a:rPr lang="en-US" smtClean="0"/>
-              <a:t>1/14/2015</a:t>
+              <a:t>3/2/2015</a:t>
             </a:fld>
             <a:endParaRPr lang="en-US"/>
           </a:p>
@@ -1926,7 +1926,7 @@
           <a:p>
             <a:fld id="{77BDE6C7-8377-45F7-9778-8568E72EC050}" type="datetimeFigureOut">
               <a:rPr lang="en-US" smtClean="0"/>
-              <a:t>1/14/2015</a:t>
+              <a:t>3/2/2015</a:t>
             </a:fld>
             <a:endParaRPr lang="en-US"/>
           </a:p>
@@ -2293,7 +2293,7 @@
           <a:p>
             <a:fld id="{77BDE6C7-8377-45F7-9778-8568E72EC050}" type="datetimeFigureOut">
               <a:rPr lang="en-US" smtClean="0"/>
-              <a:t>1/14/2015</a:t>
+              <a:t>3/2/2015</a:t>
             </a:fld>
             <a:endParaRPr lang="en-US"/>
           </a:p>
@@ -2411,7 +2411,7 @@
           <a:p>
             <a:fld id="{77BDE6C7-8377-45F7-9778-8568E72EC050}" type="datetimeFigureOut">
               <a:rPr lang="en-US" smtClean="0"/>
-              <a:t>1/14/2015</a:t>
+              <a:t>3/2/2015</a:t>
             </a:fld>
             <a:endParaRPr lang="en-US"/>
           </a:p>
@@ -2506,7 +2506,7 @@
           <a:p>
             <a:fld id="{77BDE6C7-8377-45F7-9778-8568E72EC050}" type="datetimeFigureOut">
               <a:rPr lang="en-US" smtClean="0"/>
-              <a:t>1/14/2015</a:t>
+              <a:t>3/2/2015</a:t>
             </a:fld>
             <a:endParaRPr lang="en-US"/>
           </a:p>
@@ -2783,7 +2783,7 @@
           <a:p>
             <a:fld id="{77BDE6C7-8377-45F7-9778-8568E72EC050}" type="datetimeFigureOut">
               <a:rPr lang="en-US" smtClean="0"/>
-              <a:t>1/14/2015</a:t>
+              <a:t>3/2/2015</a:t>
             </a:fld>
             <a:endParaRPr lang="en-US"/>
           </a:p>
@@ -3036,7 +3036,7 @@
           <a:p>
             <a:fld id="{77BDE6C7-8377-45F7-9778-8568E72EC050}" type="datetimeFigureOut">
               <a:rPr lang="en-US" smtClean="0"/>
-              <a:t>1/14/2015</a:t>
+              <a:t>3/2/2015</a:t>
             </a:fld>
             <a:endParaRPr lang="en-US"/>
           </a:p>
@@ -3249,7 +3249,7 @@
           <a:p>
             <a:fld id="{77BDE6C7-8377-45F7-9778-8568E72EC050}" type="datetimeFigureOut">
               <a:rPr lang="en-US" smtClean="0"/>
-              <a:t>1/14/2015</a:t>
+              <a:t>3/2/2015</a:t>
             </a:fld>
             <a:endParaRPr lang="en-US"/>
           </a:p>

</xml_diff>